<commit_message>
working to restore legacy 1.8
Closure implementation broke some of the legacy 1.8 tests.  Tweaked
let? and fungal? to interpret letrec as let and app as funcall.  This
is enough for many of the 1.8 tests to work.  Other test seem to
uncover real bugs in closure implementation. See comments in 1.8 tests.
</commit_message>
<xml_diff>
--- a/doc/Pilar.pptx
+++ b/doc/Pilar.pptx
@@ -291,7 +291,7 @@
           <a:p>
             <a:fld id="{6425B47B-390B-C241-A7A7-112FF814C3D3}" type="datetimeFigureOut">
               <a:rPr lang="en-US" smtClean="0"/>
-              <a:t>10/3/15</a:t>
+              <a:t>10/5/15</a:t>
             </a:fld>
             <a:endParaRPr lang="en-US"/>
           </a:p>
@@ -461,7 +461,7 @@
           <a:p>
             <a:fld id="{6425B47B-390B-C241-A7A7-112FF814C3D3}" type="datetimeFigureOut">
               <a:rPr lang="en-US" smtClean="0"/>
-              <a:t>10/3/15</a:t>
+              <a:t>10/5/15</a:t>
             </a:fld>
             <a:endParaRPr lang="en-US"/>
           </a:p>
@@ -641,7 +641,7 @@
           <a:p>
             <a:fld id="{6425B47B-390B-C241-A7A7-112FF814C3D3}" type="datetimeFigureOut">
               <a:rPr lang="en-US" smtClean="0"/>
-              <a:t>10/3/15</a:t>
+              <a:t>10/5/15</a:t>
             </a:fld>
             <a:endParaRPr lang="en-US"/>
           </a:p>
@@ -811,7 +811,7 @@
           <a:p>
             <a:fld id="{6425B47B-390B-C241-A7A7-112FF814C3D3}" type="datetimeFigureOut">
               <a:rPr lang="en-US" smtClean="0"/>
-              <a:t>10/3/15</a:t>
+              <a:t>10/5/15</a:t>
             </a:fld>
             <a:endParaRPr lang="en-US"/>
           </a:p>
@@ -1057,7 +1057,7 @@
           <a:p>
             <a:fld id="{6425B47B-390B-C241-A7A7-112FF814C3D3}" type="datetimeFigureOut">
               <a:rPr lang="en-US" smtClean="0"/>
-              <a:t>10/3/15</a:t>
+              <a:t>10/5/15</a:t>
             </a:fld>
             <a:endParaRPr lang="en-US"/>
           </a:p>
@@ -1345,7 +1345,7 @@
           <a:p>
             <a:fld id="{6425B47B-390B-C241-A7A7-112FF814C3D3}" type="datetimeFigureOut">
               <a:rPr lang="en-US" smtClean="0"/>
-              <a:t>10/3/15</a:t>
+              <a:t>10/5/15</a:t>
             </a:fld>
             <a:endParaRPr lang="en-US"/>
           </a:p>
@@ -1767,7 +1767,7 @@
           <a:p>
             <a:fld id="{6425B47B-390B-C241-A7A7-112FF814C3D3}" type="datetimeFigureOut">
               <a:rPr lang="en-US" smtClean="0"/>
-              <a:t>10/3/15</a:t>
+              <a:t>10/5/15</a:t>
             </a:fld>
             <a:endParaRPr lang="en-US"/>
           </a:p>
@@ -1885,7 +1885,7 @@
           <a:p>
             <a:fld id="{6425B47B-390B-C241-A7A7-112FF814C3D3}" type="datetimeFigureOut">
               <a:rPr lang="en-US" smtClean="0"/>
-              <a:t>10/3/15</a:t>
+              <a:t>10/5/15</a:t>
             </a:fld>
             <a:endParaRPr lang="en-US"/>
           </a:p>
@@ -1980,7 +1980,7 @@
           <a:p>
             <a:fld id="{6425B47B-390B-C241-A7A7-112FF814C3D3}" type="datetimeFigureOut">
               <a:rPr lang="en-US" smtClean="0"/>
-              <a:t>10/3/15</a:t>
+              <a:t>10/5/15</a:t>
             </a:fld>
             <a:endParaRPr lang="en-US"/>
           </a:p>
@@ -2257,7 +2257,7 @@
           <a:p>
             <a:fld id="{6425B47B-390B-C241-A7A7-112FF814C3D3}" type="datetimeFigureOut">
               <a:rPr lang="en-US" smtClean="0"/>
-              <a:t>10/3/15</a:t>
+              <a:t>10/5/15</a:t>
             </a:fld>
             <a:endParaRPr lang="en-US"/>
           </a:p>
@@ -2510,7 +2510,7 @@
           <a:p>
             <a:fld id="{6425B47B-390B-C241-A7A7-112FF814C3D3}" type="datetimeFigureOut">
               <a:rPr lang="en-US" smtClean="0"/>
-              <a:t>10/3/15</a:t>
+              <a:t>10/5/15</a:t>
             </a:fld>
             <a:endParaRPr lang="en-US"/>
           </a:p>
@@ -2723,7 +2723,7 @@
           <a:p>
             <a:fld id="{6425B47B-390B-C241-A7A7-112FF814C3D3}" type="datetimeFigureOut">
               <a:rPr lang="en-US" smtClean="0"/>
-              <a:t>10/3/15</a:t>
+              <a:t>10/5/15</a:t>
             </a:fld>
             <a:endParaRPr lang="en-US"/>
           </a:p>
@@ -3223,10 +3223,7 @@
           </a:p>
           <a:p>
             <a:pPr algn="ctr"/>
-            <a:r>
-              <a:rPr lang="en-US" dirty="0"/>
-              <a:t/>
-            </a:r>
+            <a:endParaRPr lang="en-US" dirty="0" smtClean="0"/>
           </a:p>
         </p:txBody>
       </p:sp>
@@ -3315,10 +3312,7 @@
           </a:p>
           <a:p>
             <a:pPr algn="ctr"/>
-            <a:r>
-              <a:rPr lang="en-US" dirty="0"/>
-              <a:t/>
-            </a:r>
+            <a:endParaRPr lang="en-US" dirty="0" smtClean="0"/>
           </a:p>
         </p:txBody>
       </p:sp>
@@ -3361,10 +3355,7 @@
           </a:p>
           <a:p>
             <a:pPr algn="ctr"/>
-            <a:r>
-              <a:rPr lang="en-US" dirty="0"/>
-              <a:t/>
-            </a:r>
+            <a:endParaRPr lang="en-US" dirty="0" smtClean="0"/>
           </a:p>
         </p:txBody>
       </p:sp>
@@ -4335,7 +4326,6 @@
               <a:rPr lang="en-US" sz="1100" dirty="0" smtClean="0"/>
               <a:t>  ret</a:t>
             </a:r>
-            <a:endParaRPr lang="en-US" sz="1100" dirty="0" smtClean="0"/>
           </a:p>
         </p:txBody>
       </p:sp>
@@ -4454,10 +4444,7 @@
           </a:p>
           <a:p>
             <a:pPr algn="ctr"/>
-            <a:r>
-              <a:rPr lang="en-US" dirty="0"/>
-              <a:t/>
-            </a:r>
+            <a:endParaRPr lang="en-US" dirty="0" smtClean="0"/>
           </a:p>
         </p:txBody>
       </p:sp>
@@ -4543,10 +4530,7 @@
           </a:p>
           <a:p>
             <a:pPr algn="ctr"/>
-            <a:r>
-              <a:rPr lang="en-US" dirty="0"/>
-              <a:t/>
-            </a:r>
+            <a:endParaRPr lang="en-US" dirty="0" smtClean="0"/>
           </a:p>
         </p:txBody>
       </p:sp>
@@ -4589,10 +4573,7 @@
           </a:p>
           <a:p>
             <a:pPr algn="ctr"/>
-            <a:r>
-              <a:rPr lang="en-US" dirty="0"/>
-              <a:t/>
-            </a:r>
+            <a:endParaRPr lang="en-US" dirty="0" smtClean="0"/>
           </a:p>
         </p:txBody>
       </p:sp>

</xml_diff>

<commit_message>
got inline closure implementation coded - passes some tests
Failing test 185: (letrec ((f (lambda (x) (g x x))) (g (lambda (x y)
(fx+ x y)))) (f 12)) ...sh: line 1:  7721 Segmentation fault: 11
</commit_message>
<xml_diff>
--- a/doc/Pilar.pptx
+++ b/doc/Pilar.pptx
@@ -5,7 +5,7 @@
     <p:sldMasterId id="2147483648" r:id="rId1"/>
   </p:sldMasterIdLst>
   <p:notesMasterIdLst>
-    <p:notesMasterId r:id="rId15"/>
+    <p:notesMasterId r:id="rId17"/>
   </p:notesMasterIdLst>
   <p:sldIdLst>
     <p:sldId id="256" r:id="rId2"/>
@@ -19,8 +19,10 @@
     <p:sldId id="260" r:id="rId10"/>
     <p:sldId id="269" r:id="rId11"/>
     <p:sldId id="270" r:id="rId12"/>
-    <p:sldId id="261" r:id="rId13"/>
-    <p:sldId id="257" r:id="rId14"/>
+    <p:sldId id="271" r:id="rId13"/>
+    <p:sldId id="272" r:id="rId14"/>
+    <p:sldId id="261" r:id="rId15"/>
+    <p:sldId id="257" r:id="rId16"/>
   </p:sldIdLst>
   <p:sldSz cx="9144000" cy="6858000" type="screen4x3"/>
   <p:notesSz cx="6858000" cy="9144000"/>
@@ -547,6 +549,90 @@
     <p:extLst>
       <p:ext uri="{BB962C8B-B14F-4D97-AF65-F5344CB8AC3E}">
         <p14:creationId xmlns:p14="http://schemas.microsoft.com/office/powerpoint/2010/main" val="934654383"/>
+      </p:ext>
+    </p:extLst>
+  </p:cSld>
+  <p:clrMapOvr>
+    <a:masterClrMapping/>
+  </p:clrMapOvr>
+</p:notes>
+</file>
+
+<file path=ppt/notesSlides/notesSlide2.xml><?xml version="1.0" encoding="utf-8"?>
+<p:notes xmlns:a="http://schemas.openxmlformats.org/drawingml/2006/main" xmlns:r="http://schemas.openxmlformats.org/officeDocument/2006/relationships" xmlns:p="http://schemas.openxmlformats.org/presentationml/2006/main">
+  <p:cSld>
+    <p:spTree>
+      <p:nvGrpSpPr>
+        <p:cNvPr id="1" name=""/>
+        <p:cNvGrpSpPr/>
+        <p:nvPr/>
+      </p:nvGrpSpPr>
+      <p:grpSpPr>
+        <a:xfrm>
+          <a:off x="0" y="0"/>
+          <a:ext cx="0" cy="0"/>
+          <a:chOff x="0" y="0"/>
+          <a:chExt cx="0" cy="0"/>
+        </a:xfrm>
+      </p:grpSpPr>
+      <p:sp>
+        <p:nvSpPr>
+          <p:cNvPr id="2" name="Slide Image Placeholder 1"/>
+          <p:cNvSpPr>
+            <a:spLocks noGrp="1" noRot="1" noChangeAspect="1"/>
+          </p:cNvSpPr>
+          <p:nvPr>
+            <p:ph type="sldImg"/>
+          </p:nvPr>
+        </p:nvSpPr>
+        <p:spPr/>
+      </p:sp>
+      <p:sp>
+        <p:nvSpPr>
+          <p:cNvPr id="3" name="Notes Placeholder 2"/>
+          <p:cNvSpPr>
+            <a:spLocks noGrp="1"/>
+          </p:cNvSpPr>
+          <p:nvPr>
+            <p:ph type="body" idx="1"/>
+          </p:nvPr>
+        </p:nvSpPr>
+        <p:spPr/>
+        <p:txBody>
+          <a:bodyPr/>
+          <a:lstStyle/>
+          <a:p>
+            <a:endParaRPr lang="en-US" dirty="0"/>
+          </a:p>
+        </p:txBody>
+      </p:sp>
+      <p:sp>
+        <p:nvSpPr>
+          <p:cNvPr id="4" name="Slide Number Placeholder 3"/>
+          <p:cNvSpPr>
+            <a:spLocks noGrp="1"/>
+          </p:cNvSpPr>
+          <p:nvPr>
+            <p:ph type="sldNum" sz="quarter" idx="10"/>
+          </p:nvPr>
+        </p:nvSpPr>
+        <p:spPr/>
+        <p:txBody>
+          <a:bodyPr/>
+          <a:lstStyle/>
+          <a:p>
+            <a:fld id="{3132090B-607A-0247-A511-90DAECC7092B}" type="slidenum">
+              <a:rPr lang="en-US" smtClean="0"/>
+              <a:t>10</a:t>
+            </a:fld>
+            <a:endParaRPr lang="en-US"/>
+          </a:p>
+        </p:txBody>
+      </p:sp>
+    </p:spTree>
+    <p:extLst>
+      <p:ext uri="{BB962C8B-B14F-4D97-AF65-F5344CB8AC3E}">
+        <p14:creationId xmlns:p14="http://schemas.microsoft.com/office/powerpoint/2010/main" val="3002079920"/>
       </p:ext>
     </p:extLst>
   </p:cSld>
@@ -3561,7 +3647,7 @@
           <a:p>
             <a:r>
               <a:rPr lang="en-US" dirty="0" err="1" smtClean="0"/>
-              <a:t>Pilar</a:t>
+              <a:t>P’lar</a:t>
             </a:r>
             <a:r>
               <a:rPr lang="en-US" dirty="0" smtClean="0"/>
@@ -3647,7 +3733,7 @@
           <a:p>
             <a:r>
               <a:rPr lang="en-US" dirty="0" smtClean="0"/>
-              <a:t>Intermediate Language</a:t>
+              <a:t>Intermediate Language (IL)</a:t>
             </a:r>
             <a:endParaRPr lang="en-US" dirty="0"/>
           </a:p>
@@ -3922,7 +4008,7 @@
                 <a:latin typeface="Andale Mono"/>
                 <a:cs typeface="Andale Mono"/>
               </a:rPr>
-              <a:t>         ;</a:t>
+              <a:t>               ;</a:t>
             </a:r>
             <a:r>
               <a:rPr lang="en-US" dirty="0">
@@ -3990,7 +4076,7 @@
                 <a:latin typeface="Andale Mono"/>
                 <a:cs typeface="Andale Mono"/>
               </a:rPr>
-              <a:t>          ;</a:t>
+              <a:t>                ;</a:t>
             </a:r>
             <a:r>
               <a:rPr lang="en-US" dirty="0">
@@ -4147,93 +4233,121 @@
               <a:t>] ...) &lt;</a:t>
             </a:r>
             <a:r>
+              <a:rPr lang="en-US" dirty="0" smtClean="0">
+                <a:latin typeface="Andale Mono"/>
+                <a:cs typeface="Andale Mono"/>
+              </a:rPr>
+              <a:t>E&gt;</a:t>
+            </a:r>
+            <a:r>
+              <a:rPr lang="en-US" dirty="0">
+                <a:latin typeface="Andale Mono"/>
+                <a:cs typeface="Andale Mono"/>
+              </a:rPr>
+              <a:t>)</a:t>
+            </a:r>
+          </a:p>
+          <a:p>
+            <a:pPr marL="0" indent="0">
+              <a:buNone/>
+            </a:pPr>
+            <a:r>
+              <a:rPr lang="en-US" dirty="0" smtClean="0">
+                <a:latin typeface="Andale Mono"/>
+                <a:cs typeface="Andale Mono"/>
+              </a:rPr>
+              <a:t>       |  </a:t>
+            </a:r>
+            <a:r>
+              <a:rPr lang="en-US" dirty="0">
+                <a:latin typeface="Andale Mono"/>
+                <a:cs typeface="Andale Mono"/>
+              </a:rPr>
+              <a:t>(</a:t>
+            </a:r>
+            <a:r>
               <a:rPr lang="en-US" dirty="0" err="1">
                 <a:latin typeface="Andale Mono"/>
                 <a:cs typeface="Andale Mono"/>
               </a:rPr>
-              <a:t>Expr</a:t>
+              <a:t>letrec</a:t>
             </a:r>
             <a:r>
               <a:rPr lang="en-US" dirty="0">
                 <a:latin typeface="Andale Mono"/>
                 <a:cs typeface="Andale Mono"/>
               </a:rPr>
-              <a:t>&gt;)</a:t>
-            </a:r>
-          </a:p>
-          <a:p>
-            <a:pPr marL="0" indent="0">
-              <a:buNone/>
-            </a:pPr>
+              <a:t> ([</a:t>
+            </a:r>
             <a:r>
               <a:rPr lang="en-US" dirty="0" smtClean="0">
                 <a:latin typeface="Andale Mono"/>
                 <a:cs typeface="Andale Mono"/>
               </a:rPr>
-              <a:t>       |  </a:t>
+              <a:t>&lt;</a:t>
             </a:r>
             <a:r>
               <a:rPr lang="en-US" dirty="0">
                 <a:latin typeface="Andale Mono"/>
                 <a:cs typeface="Andale Mono"/>
               </a:rPr>
-              <a:t>(</a:t>
-            </a:r>
-            <a:r>
-              <a:rPr lang="en-US" dirty="0" err="1">
+              <a:t>v</a:t>
+            </a:r>
+            <a:r>
+              <a:rPr lang="en-US" dirty="0" smtClean="0">
                 <a:latin typeface="Andale Mono"/>
                 <a:cs typeface="Andale Mono"/>
               </a:rPr>
-              <a:t>letrec</a:t>
+              <a:t>&gt; </a:t>
             </a:r>
             <a:r>
               <a:rPr lang="en-US" dirty="0">
                 <a:latin typeface="Andale Mono"/>
                 <a:cs typeface="Andale Mono"/>
               </a:rPr>
-              <a:t> ([&lt;</a:t>
-            </a:r>
-            <a:r>
-              <a:rPr lang="en-US" dirty="0" err="1">
+              <a:t>&lt;</a:t>
+            </a:r>
+            <a:r>
+              <a:rPr lang="en-US" dirty="0" smtClean="0">
                 <a:latin typeface="Andale Mono"/>
                 <a:cs typeface="Andale Mono"/>
               </a:rPr>
-              <a:t>Var</a:t>
+              <a:t>E&gt;</a:t>
             </a:r>
             <a:r>
               <a:rPr lang="en-US" dirty="0">
                 <a:latin typeface="Andale Mono"/>
                 <a:cs typeface="Andale Mono"/>
               </a:rPr>
-              <a:t>&gt; &lt;</a:t>
-            </a:r>
-            <a:r>
-              <a:rPr lang="en-US" dirty="0" err="1">
+              <a:t>] ...) &lt;</a:t>
+            </a:r>
+            <a:r>
+              <a:rPr lang="en-US" dirty="0" smtClean="0">
                 <a:latin typeface="Andale Mono"/>
                 <a:cs typeface="Andale Mono"/>
               </a:rPr>
-              <a:t>Expr</a:t>
+              <a:t>E&gt;</a:t>
             </a:r>
             <a:r>
               <a:rPr lang="en-US" dirty="0">
                 <a:latin typeface="Andale Mono"/>
                 <a:cs typeface="Andale Mono"/>
               </a:rPr>
-              <a:t>&gt;] ...) &lt;</a:t>
-            </a:r>
-            <a:r>
-              <a:rPr lang="en-US" dirty="0" err="1">
+              <a:t>)  </a:t>
+            </a:r>
+            <a:r>
+              <a:rPr lang="en-US" dirty="0" smtClean="0">
                 <a:latin typeface="Andale Mono"/>
                 <a:cs typeface="Andale Mono"/>
               </a:rPr>
-              <a:t>Expr</a:t>
+              <a:t>        ;</a:t>
             </a:r>
             <a:r>
               <a:rPr lang="en-US" dirty="0">
                 <a:latin typeface="Andale Mono"/>
                 <a:cs typeface="Andale Mono"/>
               </a:rPr>
-              <a:t>&gt;)  ;; key for mutual recursion</a:t>
+              <a:t>; key for mutual recursion</a:t>
             </a:r>
           </a:p>
           <a:p>
@@ -4296,35 +4410,40 @@
                 <a:latin typeface="Andale Mono"/>
                 <a:cs typeface="Andale Mono"/>
               </a:rPr>
-              <a:t>&lt;</a:t>
+              <a:t>&lt;n&gt; &lt;v&gt;</a:t>
             </a:r>
             <a:r>
               <a:rPr lang="en-US" dirty="0">
                 <a:latin typeface="Andale Mono"/>
                 <a:cs typeface="Andale Mono"/>
               </a:rPr>
-              <a:t>N</a:t>
-            </a:r>
+              <a:t>)</a:t>
+            </a:r>
+          </a:p>
+          <a:p>
+            <a:pPr marL="0" indent="0">
+              <a:buNone/>
+            </a:pPr>
             <a:r>
               <a:rPr lang="en-US" dirty="0" smtClean="0">
                 <a:latin typeface="Andale Mono"/>
                 <a:cs typeface="Andale Mono"/>
               </a:rPr>
-              <a:t>&gt; &lt;</a:t>
+              <a:t>       |  </a:t>
             </a:r>
             <a:r>
               <a:rPr lang="en-US" dirty="0">
                 <a:latin typeface="Andale Mono"/>
                 <a:cs typeface="Andale Mono"/>
               </a:rPr>
-              <a:t>V</a:t>
+              <a:t>(bound </a:t>
             </a:r>
             <a:r>
               <a:rPr lang="en-US" dirty="0" smtClean="0">
                 <a:latin typeface="Andale Mono"/>
                 <a:cs typeface="Andale Mono"/>
               </a:rPr>
-              <a:t>&gt;</a:t>
+              <a:t>&lt;n&gt; &lt;v&gt;</a:t>
             </a:r>
             <a:r>
               <a:rPr lang="en-US" dirty="0">
@@ -4350,68 +4469,21 @@
                 <a:latin typeface="Andale Mono"/>
                 <a:cs typeface="Andale Mono"/>
               </a:rPr>
-              <a:t>(bound </a:t>
+              <a:t>(local &lt;</a:t>
             </a:r>
             <a:r>
               <a:rPr lang="en-US" dirty="0" smtClean="0">
                 <a:latin typeface="Andale Mono"/>
                 <a:cs typeface="Andale Mono"/>
               </a:rPr>
-              <a:t>&lt;</a:t>
+              <a:t>v&gt;</a:t>
             </a:r>
             <a:r>
               <a:rPr lang="en-US" dirty="0">
                 <a:latin typeface="Andale Mono"/>
                 <a:cs typeface="Andale Mono"/>
               </a:rPr>
-              <a:t>N</a:t>
-            </a:r>
-            <a:r>
-              <a:rPr lang="en-US" dirty="0" smtClean="0">
-                <a:latin typeface="Andale Mono"/>
-                <a:cs typeface="Andale Mono"/>
-              </a:rPr>
-              <a:t>&gt; &lt;</a:t>
-            </a:r>
-            <a:r>
-              <a:rPr lang="en-US" dirty="0">
-                <a:latin typeface="Andale Mono"/>
-                <a:cs typeface="Andale Mono"/>
-              </a:rPr>
-              <a:t>V</a:t>
-            </a:r>
-            <a:r>
-              <a:rPr lang="en-US" dirty="0" smtClean="0">
-                <a:latin typeface="Andale Mono"/>
-                <a:cs typeface="Andale Mono"/>
-              </a:rPr>
-              <a:t>&gt;</a:t>
-            </a:r>
-            <a:r>
-              <a:rPr lang="en-US" dirty="0">
-                <a:latin typeface="Andale Mono"/>
-                <a:cs typeface="Andale Mono"/>
-              </a:rPr>
               <a:t>)</a:t>
-            </a:r>
-          </a:p>
-          <a:p>
-            <a:pPr marL="0" indent="0">
-              <a:buNone/>
-            </a:pPr>
-            <a:r>
-              <a:rPr lang="en-US" dirty="0" smtClean="0">
-                <a:latin typeface="Andale Mono"/>
-                <a:cs typeface="Andale Mono"/>
-              </a:rPr>
-              <a:t>       |  </a:t>
-            </a:r>
-            <a:r>
-              <a:rPr lang="en-US" dirty="0">
-                <a:latin typeface="Andale Mono"/>
-                <a:cs typeface="Andale Mono"/>
-              </a:rPr>
-              <a:t>(local &lt;variable&gt;)</a:t>
             </a:r>
           </a:p>
           <a:p>
@@ -4495,7 +4567,7 @@
               <a:t>i</a:t>
             </a:r>
             <a:r>
-              <a:rPr lang="en-US" smtClean="0">
+              <a:rPr lang="en-US" dirty="0" smtClean="0">
                 <a:latin typeface="Andale Mono"/>
                 <a:cs typeface="Andale Mono"/>
               </a:rPr>
@@ -4576,8 +4648,19 @@
                 <a:latin typeface="Andale Mono"/>
                 <a:cs typeface="Andale Mono"/>
               </a:rPr>
-              <a:t>&gt;  symbols other than keywords</a:t>
-            </a:r>
+              <a:t>&gt;  </a:t>
+            </a:r>
+            <a:r>
+              <a:rPr lang="en-US" dirty="0" smtClean="0">
+                <a:latin typeface="Andale Mono"/>
+                <a:cs typeface="Andale Mono"/>
+              </a:rPr>
+              <a:t>variables (symbols that are not &lt;key&gt;)</a:t>
+            </a:r>
+            <a:endParaRPr lang="en-US" dirty="0">
+              <a:latin typeface="Andale Mono"/>
+              <a:cs typeface="Andale Mono"/>
+            </a:endParaRPr>
           </a:p>
           <a:p>
             <a:pPr marL="0" indent="0">
@@ -4597,35 +4680,28 @@
                 <a:latin typeface="Andale Mono"/>
                 <a:cs typeface="Andale Mono"/>
               </a:rPr>
-              <a:t> </a:t>
+              <a:t> &lt;key&gt; </a:t>
             </a:r>
             <a:r>
               <a:rPr lang="en-US" dirty="0">
                 <a:latin typeface="Andale Mono"/>
                 <a:cs typeface="Andale Mono"/>
               </a:rPr>
-              <a:t>&lt;Key</a:t>
+              <a:t>-&gt;  begin | if | closure | let | </a:t>
+            </a:r>
+            <a:r>
+              <a:rPr lang="en-US" dirty="0" err="1" smtClean="0">
+                <a:latin typeface="Andale Mono"/>
+                <a:cs typeface="Andale Mono"/>
+              </a:rPr>
+              <a:t>letrec</a:t>
             </a:r>
             <a:r>
               <a:rPr lang="en-US" dirty="0" smtClean="0">
                 <a:latin typeface="Andale Mono"/>
                 <a:cs typeface="Andale Mono"/>
               </a:rPr>
-              <a:t>&gt; </a:t>
-            </a:r>
-            <a:r>
-              <a:rPr lang="en-US" dirty="0">
-                <a:latin typeface="Andale Mono"/>
-                <a:cs typeface="Andale Mono"/>
-              </a:rPr>
-              <a:t>-&gt;  begin | if | closure | let | </a:t>
-            </a:r>
-            <a:r>
-              <a:rPr lang="en-US" dirty="0" err="1">
-                <a:latin typeface="Andale Mono"/>
-                <a:cs typeface="Andale Mono"/>
-              </a:rPr>
-              <a:t>letrec</a:t>
+              <a:t> | free | bound | local</a:t>
             </a:r>
             <a:endParaRPr lang="en-US" dirty="0">
               <a:latin typeface="Andale Mono"/>
@@ -4679,7 +4755,11 @@
           <a:bodyPr/>
           <a:lstStyle/>
           <a:p>
-            <a:endParaRPr lang="en-US"/>
+            <a:r>
+              <a:rPr lang="en-US" dirty="0" smtClean="0"/>
+              <a:t>Free Variables</a:t>
+            </a:r>
+            <a:endParaRPr lang="en-US" dirty="0"/>
           </a:p>
         </p:txBody>
       </p:sp>
@@ -4698,7 +4778,28 @@
           <a:bodyPr/>
           <a:lstStyle/>
           <a:p>
-            <a:endParaRPr lang="en-US"/>
+            <a:r>
+              <a:rPr lang="en-US" dirty="0" smtClean="0"/>
+              <a:t>Addresses what value to assign to free variables in functions</a:t>
+            </a:r>
+          </a:p>
+          <a:p>
+            <a:r>
+              <a:rPr lang="en-US" dirty="0" smtClean="0"/>
+              <a:t>A variable is used free in a function if it is neither a formal argument nor local to that function</a:t>
+            </a:r>
+          </a:p>
+          <a:p>
+            <a:r>
+              <a:rPr lang="en-US" dirty="0" smtClean="0"/>
+              <a:t>In Scheme, functions correspond to lambda expressions</a:t>
+            </a:r>
+          </a:p>
+          <a:p>
+            <a:endParaRPr lang="en-US" dirty="0" smtClean="0"/>
+          </a:p>
+          <a:p>
+            <a:endParaRPr lang="en-US" dirty="0"/>
           </a:p>
         </p:txBody>
       </p:sp>
@@ -4744,6 +4845,232 @@
         </p:nvSpPr>
         <p:spPr/>
         <p:txBody>
+          <a:bodyPr>
+            <a:normAutofit/>
+          </a:bodyPr>
+          <a:lstStyle/>
+          <a:p>
+            <a:r>
+              <a:rPr lang="en-US" dirty="0" smtClean="0"/>
+              <a:t>Convert Lambda to Closure</a:t>
+            </a:r>
+            <a:endParaRPr lang="en-US" dirty="0"/>
+          </a:p>
+        </p:txBody>
+      </p:sp>
+      <p:sp>
+        <p:nvSpPr>
+          <p:cNvPr id="3" name="Content Placeholder 2"/>
+          <p:cNvSpPr>
+            <a:spLocks noGrp="1"/>
+          </p:cNvSpPr>
+          <p:nvPr>
+            <p:ph idx="1"/>
+          </p:nvPr>
+        </p:nvSpPr>
+        <p:spPr/>
+        <p:txBody>
+          <a:bodyPr>
+            <a:normAutofit/>
+          </a:bodyPr>
+          <a:lstStyle/>
+          <a:p>
+            <a:pPr marL="0" indent="0">
+              <a:buNone/>
+            </a:pPr>
+            <a:r>
+              <a:rPr lang="en-US" dirty="0" smtClean="0"/>
+              <a:t>(let ((x 5))</a:t>
+            </a:r>
+          </a:p>
+          <a:p>
+            <a:pPr marL="0" indent="0">
+              <a:buNone/>
+            </a:pPr>
+            <a:r>
+              <a:rPr lang="en-US" dirty="0"/>
+              <a:t> </a:t>
+            </a:r>
+            <a:r>
+              <a:rPr lang="en-US" dirty="0" smtClean="0"/>
+              <a:t>     (lambda (y) </a:t>
+            </a:r>
+          </a:p>
+          <a:p>
+            <a:pPr marL="0" indent="0">
+              <a:buNone/>
+            </a:pPr>
+            <a:r>
+              <a:rPr lang="en-US" dirty="0"/>
+              <a:t> </a:t>
+            </a:r>
+            <a:r>
+              <a:rPr lang="en-US" dirty="0" smtClean="0"/>
+              <a:t>           (lambda () (+ x y))))</a:t>
+            </a:r>
+            <a:endParaRPr lang="en-US" dirty="0"/>
+          </a:p>
+          <a:p>
+            <a:pPr marL="0" indent="0">
+              <a:buNone/>
+            </a:pPr>
+            <a:r>
+              <a:rPr lang="en-US" dirty="0" smtClean="0"/>
+              <a:t> ==&gt;</a:t>
+            </a:r>
+            <a:endParaRPr lang="en-US" dirty="0"/>
+          </a:p>
+          <a:p>
+            <a:pPr marL="0" indent="0">
+              <a:buNone/>
+            </a:pPr>
+            <a:r>
+              <a:rPr lang="en-US" dirty="0" smtClean="0"/>
+              <a:t>(let ((x 5))</a:t>
+            </a:r>
+          </a:p>
+          <a:p>
+            <a:pPr marL="0" indent="0">
+              <a:buNone/>
+            </a:pPr>
+            <a:r>
+              <a:rPr lang="en-US" dirty="0"/>
+              <a:t> </a:t>
+            </a:r>
+            <a:r>
+              <a:rPr lang="en-US" dirty="0" smtClean="0"/>
+              <a:t>    (closure (y) (x) </a:t>
+            </a:r>
+          </a:p>
+          <a:p>
+            <a:pPr marL="0" indent="0">
+              <a:buNone/>
+            </a:pPr>
+            <a:r>
+              <a:rPr lang="en-US" dirty="0"/>
+              <a:t> </a:t>
+            </a:r>
+            <a:r>
+              <a:rPr lang="en-US" dirty="0" smtClean="0"/>
+              <a:t>            (closure () (x y)(+ x y))</a:t>
+            </a:r>
+          </a:p>
+        </p:txBody>
+      </p:sp>
+    </p:spTree>
+    <p:extLst>
+      <p:ext uri="{BB962C8B-B14F-4D97-AF65-F5344CB8AC3E}">
+        <p14:creationId xmlns:p14="http://schemas.microsoft.com/office/powerpoint/2010/main" val="1069071318"/>
+      </p:ext>
+    </p:extLst>
+  </p:cSld>
+  <p:clrMapOvr>
+    <a:masterClrMapping/>
+  </p:clrMapOvr>
+</p:sld>
+</file>
+
+<file path=ppt/slides/slide13.xml><?xml version="1.0" encoding="utf-8"?>
+<p:sld xmlns:a="http://schemas.openxmlformats.org/drawingml/2006/main" xmlns:r="http://schemas.openxmlformats.org/officeDocument/2006/relationships" xmlns:p="http://schemas.openxmlformats.org/presentationml/2006/main">
+  <p:cSld>
+    <p:spTree>
+      <p:nvGrpSpPr>
+        <p:cNvPr id="1" name=""/>
+        <p:cNvGrpSpPr/>
+        <p:nvPr/>
+      </p:nvGrpSpPr>
+      <p:grpSpPr>
+        <a:xfrm>
+          <a:off x="0" y="0"/>
+          <a:ext cx="0" cy="0"/>
+          <a:chOff x="0" y="0"/>
+          <a:chExt cx="0" cy="0"/>
+        </a:xfrm>
+      </p:grpSpPr>
+      <p:sp>
+        <p:nvSpPr>
+          <p:cNvPr id="2" name="Title 1"/>
+          <p:cNvSpPr>
+            <a:spLocks noGrp="1"/>
+          </p:cNvSpPr>
+          <p:nvPr>
+            <p:ph type="title"/>
+          </p:nvPr>
+        </p:nvSpPr>
+        <p:spPr/>
+        <p:txBody>
+          <a:bodyPr/>
+          <a:lstStyle/>
+          <a:p>
+            <a:r>
+              <a:rPr lang="en-US" dirty="0" smtClean="0"/>
+              <a:t>Compiling Closures</a:t>
+            </a:r>
+            <a:endParaRPr lang="en-US" dirty="0"/>
+          </a:p>
+        </p:txBody>
+      </p:sp>
+      <p:sp>
+        <p:nvSpPr>
+          <p:cNvPr id="3" name="Content Placeholder 2"/>
+          <p:cNvSpPr>
+            <a:spLocks noGrp="1"/>
+          </p:cNvSpPr>
+          <p:nvPr>
+            <p:ph idx="1"/>
+          </p:nvPr>
+        </p:nvSpPr>
+        <p:spPr/>
+        <p:txBody>
+          <a:bodyPr/>
+          <a:lstStyle/>
+          <a:p>
+            <a:endParaRPr lang="en-US"/>
+          </a:p>
+        </p:txBody>
+      </p:sp>
+    </p:spTree>
+    <p:extLst>
+      <p:ext uri="{BB962C8B-B14F-4D97-AF65-F5344CB8AC3E}">
+        <p14:creationId xmlns:p14="http://schemas.microsoft.com/office/powerpoint/2010/main" val="3720307734"/>
+      </p:ext>
+    </p:extLst>
+  </p:cSld>
+  <p:clrMapOvr>
+    <a:masterClrMapping/>
+  </p:clrMapOvr>
+</p:sld>
+</file>
+
+<file path=ppt/slides/slide14.xml><?xml version="1.0" encoding="utf-8"?>
+<p:sld xmlns:a="http://schemas.openxmlformats.org/drawingml/2006/main" xmlns:r="http://schemas.openxmlformats.org/officeDocument/2006/relationships" xmlns:p="http://schemas.openxmlformats.org/presentationml/2006/main">
+  <p:cSld>
+    <p:spTree>
+      <p:nvGrpSpPr>
+        <p:cNvPr id="1" name=""/>
+        <p:cNvGrpSpPr/>
+        <p:nvPr/>
+      </p:nvGrpSpPr>
+      <p:grpSpPr>
+        <a:xfrm>
+          <a:off x="0" y="0"/>
+          <a:ext cx="0" cy="0"/>
+          <a:chOff x="0" y="0"/>
+          <a:chExt cx="0" cy="0"/>
+        </a:xfrm>
+      </p:grpSpPr>
+      <p:sp>
+        <p:nvSpPr>
+          <p:cNvPr id="2" name="Title 1"/>
+          <p:cNvSpPr>
+            <a:spLocks noGrp="1"/>
+          </p:cNvSpPr>
+          <p:nvPr>
+            <p:ph type="title"/>
+          </p:nvPr>
+        </p:nvSpPr>
+        <p:spPr/>
+        <p:txBody>
           <a:bodyPr/>
           <a:lstStyle/>
           <a:p>
@@ -4787,7 +5114,7 @@
 </p:sld>
 </file>
 
-<file path=ppt/slides/slide13.xml><?xml version="1.0" encoding="utf-8"?>
+<file path=ppt/slides/slide15.xml><?xml version="1.0" encoding="utf-8"?>
 <p:sld xmlns:a="http://schemas.openxmlformats.org/drawingml/2006/main" xmlns:r="http://schemas.openxmlformats.org/officeDocument/2006/relationships" xmlns:p="http://schemas.openxmlformats.org/presentationml/2006/main">
   <p:cSld>
     <p:spTree>
@@ -6902,13 +7229,13 @@
           <a:p>
             <a:r>
               <a:rPr lang="en-US" dirty="0" smtClean="0"/>
-              <a:t>Comprehensible compiler implementation</a:t>
+              <a:t>Clean, comprehensible code</a:t>
             </a:r>
           </a:p>
           <a:p>
             <a:r>
               <a:rPr lang="en-US" dirty="0" smtClean="0"/>
-              <a:t>Implement in a reasonable timeframe 3 -5 months of effort</a:t>
+              <a:t>Implementable in 3 -5 months </a:t>
             </a:r>
           </a:p>
           <a:p>
@@ -7001,7 +7328,7 @@
             </a:r>
             <a:r>
               <a:rPr lang="en-US" dirty="0" err="1" smtClean="0"/>
-              <a:t>Ghuloum’s</a:t>
+              <a:t>Ghuloum</a:t>
             </a:r>
             <a:r>
               <a:rPr lang="en-US" dirty="0" smtClean="0"/>
@@ -7011,15 +7338,7 @@
           <a:p>
             <a:r>
               <a:rPr lang="en-US" dirty="0" smtClean="0"/>
-              <a:t>Use a stack based runtime with a heap for </a:t>
-            </a:r>
-            <a:r>
-              <a:rPr lang="en-US" dirty="0" err="1" smtClean="0"/>
-              <a:t>persistant</a:t>
-            </a:r>
-            <a:r>
-              <a:rPr lang="en-US" dirty="0" smtClean="0"/>
-              <a:t> value including closures.</a:t>
+              <a:t>Use a stack based runtime with a heap for persistent value including closures.</a:t>
             </a:r>
           </a:p>
           <a:p>

</xml_diff>

<commit_message>
stuck trying to get proper tail calls to work
Still crashing.  Don’t understand why I emit a tail call when the
function is not even a recursive call?  Shouldn’t we just generate a
conventional call in the tail position if the function isn’t recursive?
 We no really because there is not need to save the context if we are
going to throw it out as soon as we return.  Hmmm…
</commit_message>
<xml_diff>
--- a/doc/Pilar.pptx
+++ b/doc/Pilar.pptx
@@ -212,7 +212,7 @@
           <a:p>
             <a:fld id="{5607465C-914C-044A-8711-438AB6BFCD99}" type="datetimeFigureOut">
               <a:rPr lang="en-US" smtClean="0"/>
-              <a:t>11/30/15</a:t>
+              <a:t>12/1/15</a:t>
             </a:fld>
             <a:endParaRPr lang="en-US"/>
           </a:p>
@@ -997,7 +997,7 @@
           <a:p>
             <a:fld id="{6425B47B-390B-C241-A7A7-112FF814C3D3}" type="datetimeFigureOut">
               <a:rPr lang="en-US" smtClean="0"/>
-              <a:t>11/30/15</a:t>
+              <a:t>12/1/15</a:t>
             </a:fld>
             <a:endParaRPr lang="en-US"/>
           </a:p>
@@ -1167,7 +1167,7 @@
           <a:p>
             <a:fld id="{6425B47B-390B-C241-A7A7-112FF814C3D3}" type="datetimeFigureOut">
               <a:rPr lang="en-US" smtClean="0"/>
-              <a:t>11/30/15</a:t>
+              <a:t>12/1/15</a:t>
             </a:fld>
             <a:endParaRPr lang="en-US"/>
           </a:p>
@@ -1347,7 +1347,7 @@
           <a:p>
             <a:fld id="{6425B47B-390B-C241-A7A7-112FF814C3D3}" type="datetimeFigureOut">
               <a:rPr lang="en-US" smtClean="0"/>
-              <a:t>11/30/15</a:t>
+              <a:t>12/1/15</a:t>
             </a:fld>
             <a:endParaRPr lang="en-US"/>
           </a:p>
@@ -1517,7 +1517,7 @@
           <a:p>
             <a:fld id="{6425B47B-390B-C241-A7A7-112FF814C3D3}" type="datetimeFigureOut">
               <a:rPr lang="en-US" smtClean="0"/>
-              <a:t>11/30/15</a:t>
+              <a:t>12/1/15</a:t>
             </a:fld>
             <a:endParaRPr lang="en-US"/>
           </a:p>
@@ -1763,7 +1763,7 @@
           <a:p>
             <a:fld id="{6425B47B-390B-C241-A7A7-112FF814C3D3}" type="datetimeFigureOut">
               <a:rPr lang="en-US" smtClean="0"/>
-              <a:t>11/30/15</a:t>
+              <a:t>12/1/15</a:t>
             </a:fld>
             <a:endParaRPr lang="en-US"/>
           </a:p>
@@ -2051,7 +2051,7 @@
           <a:p>
             <a:fld id="{6425B47B-390B-C241-A7A7-112FF814C3D3}" type="datetimeFigureOut">
               <a:rPr lang="en-US" smtClean="0"/>
-              <a:t>11/30/15</a:t>
+              <a:t>12/1/15</a:t>
             </a:fld>
             <a:endParaRPr lang="en-US"/>
           </a:p>
@@ -2473,7 +2473,7 @@
           <a:p>
             <a:fld id="{6425B47B-390B-C241-A7A7-112FF814C3D3}" type="datetimeFigureOut">
               <a:rPr lang="en-US" smtClean="0"/>
-              <a:t>11/30/15</a:t>
+              <a:t>12/1/15</a:t>
             </a:fld>
             <a:endParaRPr lang="en-US"/>
           </a:p>
@@ -2591,7 +2591,7 @@
           <a:p>
             <a:fld id="{6425B47B-390B-C241-A7A7-112FF814C3D3}" type="datetimeFigureOut">
               <a:rPr lang="en-US" smtClean="0"/>
-              <a:t>11/30/15</a:t>
+              <a:t>12/1/15</a:t>
             </a:fld>
             <a:endParaRPr lang="en-US"/>
           </a:p>
@@ -2686,7 +2686,7 @@
           <a:p>
             <a:fld id="{6425B47B-390B-C241-A7A7-112FF814C3D3}" type="datetimeFigureOut">
               <a:rPr lang="en-US" smtClean="0"/>
-              <a:t>11/30/15</a:t>
+              <a:t>12/1/15</a:t>
             </a:fld>
             <a:endParaRPr lang="en-US"/>
           </a:p>
@@ -2963,7 +2963,7 @@
           <a:p>
             <a:fld id="{6425B47B-390B-C241-A7A7-112FF814C3D3}" type="datetimeFigureOut">
               <a:rPr lang="en-US" smtClean="0"/>
-              <a:t>11/30/15</a:t>
+              <a:t>12/1/15</a:t>
             </a:fld>
             <a:endParaRPr lang="en-US"/>
           </a:p>
@@ -3216,7 +3216,7 @@
           <a:p>
             <a:fld id="{6425B47B-390B-C241-A7A7-112FF814C3D3}" type="datetimeFigureOut">
               <a:rPr lang="en-US" smtClean="0"/>
-              <a:t>11/30/15</a:t>
+              <a:t>12/1/15</a:t>
             </a:fld>
             <a:endParaRPr lang="en-US"/>
           </a:p>
@@ -3429,7 +3429,7 @@
           <a:p>
             <a:fld id="{6425B47B-390B-C241-A7A7-112FF814C3D3}" type="datetimeFigureOut">
               <a:rPr lang="en-US" smtClean="0"/>
-              <a:t>11/30/15</a:t>
+              <a:t>12/1/15</a:t>
             </a:fld>
             <a:endParaRPr lang="en-US"/>
           </a:p>
@@ -9604,17 +9604,7 @@
                 <a:latin typeface="Consolas" panose="020B0609020204030204" pitchFamily="49" charset="0"/>
                 <a:cs typeface="Consolas" panose="020B0609020204030204" pitchFamily="49" charset="0"/>
               </a:rPr>
-              <a:t>;; </a:t>
-            </a:r>
-            <a:r>
-              <a:rPr lang="en-US" dirty="0" smtClean="0">
-                <a:solidFill>
-                  <a:srgbClr val="FF0000"/>
-                </a:solidFill>
-                <a:latin typeface="Consolas" panose="020B0609020204030204" pitchFamily="49" charset="0"/>
-                <a:cs typeface="Consolas" panose="020B0609020204030204" pitchFamily="49" charset="0"/>
-              </a:rPr>
-              <a:t>?should this be -8?</a:t>
+              <a:t>;; ?should this be -8?</a:t>
             </a:r>
             <a:endParaRPr lang="en-US" dirty="0">
               <a:solidFill>
@@ -19609,6 +19599,107 @@
               <a:t>%edi + 8</a:t>
             </a:r>
             <a:endParaRPr lang="en-US" sz="1000" dirty="0"/>
+          </a:p>
+        </p:txBody>
+      </p:sp>
+      <p:sp>
+        <p:nvSpPr>
+          <p:cNvPr id="3" name="TextBox 2"/>
+          <p:cNvSpPr txBox="1"/>
+          <p:nvPr/>
+        </p:nvSpPr>
+        <p:spPr>
+          <a:xfrm>
+            <a:off x="6037071" y="874277"/>
+            <a:ext cx="2308670" cy="646331"/>
+          </a:xfrm>
+          <a:prstGeom prst="rect">
+            <a:avLst/>
+          </a:prstGeom>
+          <a:solidFill>
+            <a:schemeClr val="accent5">
+              <a:lumMod val="20000"/>
+              <a:lumOff val="80000"/>
+            </a:schemeClr>
+          </a:solidFill>
+        </p:spPr>
+        <p:txBody>
+          <a:bodyPr wrap="none" rtlCol="0">
+            <a:spAutoFit/>
+          </a:bodyPr>
+          <a:lstStyle/>
+          <a:p>
+            <a:r>
+              <a:rPr lang="en-US" sz="1200" dirty="0" smtClean="0">
+                <a:latin typeface="Andale Mono"/>
+                <a:cs typeface="Andale Mono"/>
+              </a:rPr>
+              <a:t>%</a:t>
+            </a:r>
+            <a:r>
+              <a:rPr lang="en-US" sz="1200" dirty="0" err="1" smtClean="0">
+                <a:latin typeface="Andale Mono"/>
+                <a:cs typeface="Andale Mono"/>
+              </a:rPr>
+              <a:t>edi</a:t>
+            </a:r>
+            <a:r>
+              <a:rPr lang="en-US" sz="1200" dirty="0" smtClean="0">
+                <a:latin typeface="Andale Mono"/>
+                <a:cs typeface="Andale Mono"/>
+              </a:rPr>
+              <a:t>  current closure</a:t>
+            </a:r>
+          </a:p>
+          <a:p>
+            <a:r>
+              <a:rPr lang="en-US" sz="1200" dirty="0" smtClean="0">
+                <a:latin typeface="Andale Mono"/>
+                <a:cs typeface="Andale Mono"/>
+              </a:rPr>
+              <a:t>%</a:t>
+            </a:r>
+            <a:r>
+              <a:rPr lang="en-US" sz="1200" dirty="0" err="1" smtClean="0">
+                <a:latin typeface="Andale Mono"/>
+                <a:cs typeface="Andale Mono"/>
+              </a:rPr>
+              <a:t>esp</a:t>
+            </a:r>
+            <a:r>
+              <a:rPr lang="en-US" sz="1200" dirty="0" smtClean="0">
+                <a:latin typeface="Andale Mono"/>
+                <a:cs typeface="Andale Mono"/>
+              </a:rPr>
+              <a:t>  stack pointer</a:t>
+            </a:r>
+          </a:p>
+          <a:p>
+            <a:r>
+              <a:rPr lang="en-US" sz="1200" dirty="0" smtClean="0">
+                <a:latin typeface="Andale Mono"/>
+                <a:cs typeface="Andale Mono"/>
+              </a:rPr>
+              <a:t>%</a:t>
+            </a:r>
+            <a:r>
+              <a:rPr lang="en-US" sz="1200" dirty="0" err="1" smtClean="0">
+                <a:latin typeface="Andale Mono"/>
+                <a:cs typeface="Andale Mono"/>
+              </a:rPr>
+              <a:t>ebp</a:t>
+            </a:r>
+            <a:r>
+              <a:rPr lang="en-US" sz="1200" dirty="0" smtClean="0">
+                <a:latin typeface="Andale Mono"/>
+                <a:cs typeface="Andale Mono"/>
+              </a:rPr>
+              <a:t>  free heap pointer</a:t>
+            </a:r>
+            <a:endParaRPr lang="en-US" sz="1200" dirty="0">
+              <a:latin typeface="Andale Mono"/>
+              <a:cs typeface="Andale Mono"/>
+            </a:endParaRPr>
           </a:p>
         </p:txBody>
       </p:sp>

</xml_diff>

<commit_message>
grinding away at proper tail calls bug
seems to get parameters confused on the stack.  Mistakes a 1000 and 100
sitting on the stack.  Doubles the 1000 value instead of finding the
100 value separate.  Pretty clear this is the problem — need to drill
in to root cause.
</commit_message>
<xml_diff>
--- a/doc/Pilar.pptx
+++ b/doc/Pilar.pptx
@@ -19700,6 +19700,32 @@
               <a:latin typeface="Andale Mono"/>
               <a:cs typeface="Andale Mono"/>
             </a:endParaRPr>
+          </a:p>
+        </p:txBody>
+      </p:sp>
+      <p:sp>
+        <p:nvSpPr>
+          <p:cNvPr id="5" name="TextBox 4"/>
+          <p:cNvSpPr txBox="1"/>
+          <p:nvPr/>
+        </p:nvSpPr>
+        <p:spPr>
+          <a:xfrm>
+            <a:off x="10056267" y="852956"/>
+            <a:ext cx="184666" cy="369332"/>
+          </a:xfrm>
+          <a:prstGeom prst="rect">
+            <a:avLst/>
+          </a:prstGeom>
+          <a:noFill/>
+        </p:spPr>
+        <p:txBody>
+          <a:bodyPr wrap="none" rtlCol="0">
+            <a:spAutoFit/>
+          </a:bodyPr>
+          <a:lstStyle/>
+          <a:p>
+            <a:endParaRPr lang="en-US"/>
           </a:p>
         </p:txBody>
       </p:sp>

</xml_diff>

<commit_message>
some progress on bug
Correct some related issues in environment management.  Still have not
found the exact cause.  But only have a small segment of code to
analyze.  I feel close.
</commit_message>
<xml_diff>
--- a/doc/Pilar.pptx
+++ b/doc/Pilar.pptx
@@ -212,7 +212,7 @@
           <a:p>
             <a:fld id="{5607465C-914C-044A-8711-438AB6BFCD99}" type="datetimeFigureOut">
               <a:rPr lang="en-US" smtClean="0"/>
-              <a:t>12/1/15</a:t>
+              <a:t>12/2/15</a:t>
             </a:fld>
             <a:endParaRPr lang="en-US"/>
           </a:p>
@@ -997,7 +997,7 @@
           <a:p>
             <a:fld id="{6425B47B-390B-C241-A7A7-112FF814C3D3}" type="datetimeFigureOut">
               <a:rPr lang="en-US" smtClean="0"/>
-              <a:t>12/1/15</a:t>
+              <a:t>12/2/15</a:t>
             </a:fld>
             <a:endParaRPr lang="en-US"/>
           </a:p>
@@ -1167,7 +1167,7 @@
           <a:p>
             <a:fld id="{6425B47B-390B-C241-A7A7-112FF814C3D3}" type="datetimeFigureOut">
               <a:rPr lang="en-US" smtClean="0"/>
-              <a:t>12/1/15</a:t>
+              <a:t>12/2/15</a:t>
             </a:fld>
             <a:endParaRPr lang="en-US"/>
           </a:p>
@@ -1347,7 +1347,7 @@
           <a:p>
             <a:fld id="{6425B47B-390B-C241-A7A7-112FF814C3D3}" type="datetimeFigureOut">
               <a:rPr lang="en-US" smtClean="0"/>
-              <a:t>12/1/15</a:t>
+              <a:t>12/2/15</a:t>
             </a:fld>
             <a:endParaRPr lang="en-US"/>
           </a:p>
@@ -1517,7 +1517,7 @@
           <a:p>
             <a:fld id="{6425B47B-390B-C241-A7A7-112FF814C3D3}" type="datetimeFigureOut">
               <a:rPr lang="en-US" smtClean="0"/>
-              <a:t>12/1/15</a:t>
+              <a:t>12/2/15</a:t>
             </a:fld>
             <a:endParaRPr lang="en-US"/>
           </a:p>
@@ -1763,7 +1763,7 @@
           <a:p>
             <a:fld id="{6425B47B-390B-C241-A7A7-112FF814C3D3}" type="datetimeFigureOut">
               <a:rPr lang="en-US" smtClean="0"/>
-              <a:t>12/1/15</a:t>
+              <a:t>12/2/15</a:t>
             </a:fld>
             <a:endParaRPr lang="en-US"/>
           </a:p>
@@ -2051,7 +2051,7 @@
           <a:p>
             <a:fld id="{6425B47B-390B-C241-A7A7-112FF814C3D3}" type="datetimeFigureOut">
               <a:rPr lang="en-US" smtClean="0"/>
-              <a:t>12/1/15</a:t>
+              <a:t>12/2/15</a:t>
             </a:fld>
             <a:endParaRPr lang="en-US"/>
           </a:p>
@@ -2473,7 +2473,7 @@
           <a:p>
             <a:fld id="{6425B47B-390B-C241-A7A7-112FF814C3D3}" type="datetimeFigureOut">
               <a:rPr lang="en-US" smtClean="0"/>
-              <a:t>12/1/15</a:t>
+              <a:t>12/2/15</a:t>
             </a:fld>
             <a:endParaRPr lang="en-US"/>
           </a:p>
@@ -2591,7 +2591,7 @@
           <a:p>
             <a:fld id="{6425B47B-390B-C241-A7A7-112FF814C3D3}" type="datetimeFigureOut">
               <a:rPr lang="en-US" smtClean="0"/>
-              <a:t>12/1/15</a:t>
+              <a:t>12/2/15</a:t>
             </a:fld>
             <a:endParaRPr lang="en-US"/>
           </a:p>
@@ -2686,7 +2686,7 @@
           <a:p>
             <a:fld id="{6425B47B-390B-C241-A7A7-112FF814C3D3}" type="datetimeFigureOut">
               <a:rPr lang="en-US" smtClean="0"/>
-              <a:t>12/1/15</a:t>
+              <a:t>12/2/15</a:t>
             </a:fld>
             <a:endParaRPr lang="en-US"/>
           </a:p>
@@ -2963,7 +2963,7 @@
           <a:p>
             <a:fld id="{6425B47B-390B-C241-A7A7-112FF814C3D3}" type="datetimeFigureOut">
               <a:rPr lang="en-US" smtClean="0"/>
-              <a:t>12/1/15</a:t>
+              <a:t>12/2/15</a:t>
             </a:fld>
             <a:endParaRPr lang="en-US"/>
           </a:p>
@@ -3216,7 +3216,7 @@
           <a:p>
             <a:fld id="{6425B47B-390B-C241-A7A7-112FF814C3D3}" type="datetimeFigureOut">
               <a:rPr lang="en-US" smtClean="0"/>
-              <a:t>12/1/15</a:t>
+              <a:t>12/2/15</a:t>
             </a:fld>
             <a:endParaRPr lang="en-US"/>
           </a:p>
@@ -3429,7 +3429,7 @@
           <a:p>
             <a:fld id="{6425B47B-390B-C241-A7A7-112FF814C3D3}" type="datetimeFigureOut">
               <a:rPr lang="en-US" smtClean="0"/>
-              <a:t>12/1/15</a:t>
+              <a:t>12/2/15</a:t>
             </a:fld>
             <a:endParaRPr lang="en-US"/>
           </a:p>
@@ -8290,18 +8290,18 @@
               <a:buNone/>
             </a:pPr>
             <a:r>
-              <a:rPr lang="en-US" sz="1100" dirty="0" err="1" smtClean="0">
-                <a:latin typeface="Consolas" panose="020B0609020204030204" pitchFamily="49" charset="0"/>
-                <a:cs typeface="Consolas" panose="020B0609020204030204" pitchFamily="49" charset="0"/>
-              </a:rPr>
-              <a:t>incomming</a:t>
-            </a:r>
-            <a:r>
               <a:rPr lang="en-US" sz="1100" dirty="0" smtClean="0">
                 <a:latin typeface="Consolas" panose="020B0609020204030204" pitchFamily="49" charset="0"/>
                 <a:cs typeface="Consolas" panose="020B0609020204030204" pitchFamily="49" charset="0"/>
               </a:rPr>
-              <a:t> |   arg 2    |  %esp - 12</a:t>
+              <a:t>incoming  |   </a:t>
+            </a:r>
+            <a:r>
+              <a:rPr lang="en-US" sz="1100" dirty="0" smtClean="0">
+                <a:latin typeface="Consolas" panose="020B0609020204030204" pitchFamily="49" charset="0"/>
+                <a:cs typeface="Consolas" panose="020B0609020204030204" pitchFamily="49" charset="0"/>
+              </a:rPr>
+              <a:t>arg 2    |  %esp - 12</a:t>
             </a:r>
           </a:p>
           <a:p>
@@ -19386,8 +19386,8 @@
         </p:nvSpPr>
         <p:spPr>
           <a:xfrm>
-            <a:off x="2647980" y="846410"/>
-            <a:ext cx="561998" cy="246221"/>
+            <a:off x="2515288" y="855887"/>
+            <a:ext cx="738391" cy="400110"/>
           </a:xfrm>
           <a:prstGeom prst="rect">
             <a:avLst/>
@@ -19402,8 +19402,10 @@
           <a:p>
             <a:r>
               <a:rPr lang="en-US" sz="1000" dirty="0" smtClean="0"/>
-              <a:t>closure</a:t>
-            </a:r>
+              <a:t>Closure - 2 </a:t>
+            </a:r>
+          </a:p>
+          <a:p>
             <a:endParaRPr lang="en-US" sz="1000" dirty="0"/>
           </a:p>
         </p:txBody>
@@ -19726,6 +19728,52 @@
           <a:lstStyle/>
           <a:p>
             <a:endParaRPr lang="en-US"/>
+          </a:p>
+        </p:txBody>
+      </p:sp>
+      <p:sp>
+        <p:nvSpPr>
+          <p:cNvPr id="10" name="TextBox 9"/>
+          <p:cNvSpPr txBox="1"/>
+          <p:nvPr/>
+        </p:nvSpPr>
+        <p:spPr>
+          <a:xfrm>
+            <a:off x="284079" y="1220526"/>
+            <a:ext cx="2940951" cy="600164"/>
+          </a:xfrm>
+          <a:prstGeom prst="rect">
+            <a:avLst/>
+          </a:prstGeom>
+          <a:noFill/>
+        </p:spPr>
+        <p:txBody>
+          <a:bodyPr wrap="square" rtlCol="0">
+            <a:spAutoFit/>
+          </a:bodyPr>
+          <a:lstStyle/>
+          <a:p>
+            <a:r>
+              <a:rPr lang="en-US" sz="1100" dirty="0" smtClean="0"/>
+              <a:t>The closure value saved in the stack has its tag field set so we must correct by -2 when we use this pointer.  E.g. </a:t>
+            </a:r>
+            <a:r>
+              <a:rPr lang="en-US" sz="1100" dirty="0" err="1" smtClean="0"/>
+              <a:t>jmp</a:t>
+            </a:r>
+            <a:r>
+              <a:rPr lang="en-US" sz="1100" dirty="0" smtClean="0"/>
+              <a:t> *-2(%</a:t>
+            </a:r>
+            <a:r>
+              <a:rPr lang="en-US" sz="1100" dirty="0" err="1" smtClean="0"/>
+              <a:t>esp</a:t>
+            </a:r>
+            <a:r>
+              <a:rPr lang="en-US" sz="1100" dirty="0" smtClean="0"/>
+              <a:t>)</a:t>
+            </a:r>
+            <a:endParaRPr lang="en-US" sz="1100" dirty="0"/>
           </a:p>
         </p:txBody>
       </p:sp>

</xml_diff>

<commit_message>
breakthrough proper tail calls passes all tests
Did major reconstruction of procedure calls.  Commented code with
clearer analysis of stack layout and procedure linkage assumptions.
Was not clear before on conventions around closure slot in the stack
frame.  See comments in code for clarification.  Added stack diagrams.
</commit_message>
<xml_diff>
--- a/doc/Pilar.pptx
+++ b/doc/Pilar.pptx
@@ -212,7 +212,7 @@
           <a:p>
             <a:fld id="{5607465C-914C-044A-8711-438AB6BFCD99}" type="datetimeFigureOut">
               <a:rPr lang="en-US" smtClean="0"/>
-              <a:t>12/2/15</a:t>
+              <a:t>12/5/15</a:t>
             </a:fld>
             <a:endParaRPr lang="en-US"/>
           </a:p>
@@ -997,7 +997,7 @@
           <a:p>
             <a:fld id="{6425B47B-390B-C241-A7A7-112FF814C3D3}" type="datetimeFigureOut">
               <a:rPr lang="en-US" smtClean="0"/>
-              <a:t>12/2/15</a:t>
+              <a:t>12/5/15</a:t>
             </a:fld>
             <a:endParaRPr lang="en-US"/>
           </a:p>
@@ -1167,7 +1167,7 @@
           <a:p>
             <a:fld id="{6425B47B-390B-C241-A7A7-112FF814C3D3}" type="datetimeFigureOut">
               <a:rPr lang="en-US" smtClean="0"/>
-              <a:t>12/2/15</a:t>
+              <a:t>12/5/15</a:t>
             </a:fld>
             <a:endParaRPr lang="en-US"/>
           </a:p>
@@ -1347,7 +1347,7 @@
           <a:p>
             <a:fld id="{6425B47B-390B-C241-A7A7-112FF814C3D3}" type="datetimeFigureOut">
               <a:rPr lang="en-US" smtClean="0"/>
-              <a:t>12/2/15</a:t>
+              <a:t>12/5/15</a:t>
             </a:fld>
             <a:endParaRPr lang="en-US"/>
           </a:p>
@@ -1517,7 +1517,7 @@
           <a:p>
             <a:fld id="{6425B47B-390B-C241-A7A7-112FF814C3D3}" type="datetimeFigureOut">
               <a:rPr lang="en-US" smtClean="0"/>
-              <a:t>12/2/15</a:t>
+              <a:t>12/5/15</a:t>
             </a:fld>
             <a:endParaRPr lang="en-US"/>
           </a:p>
@@ -1763,7 +1763,7 @@
           <a:p>
             <a:fld id="{6425B47B-390B-C241-A7A7-112FF814C3D3}" type="datetimeFigureOut">
               <a:rPr lang="en-US" smtClean="0"/>
-              <a:t>12/2/15</a:t>
+              <a:t>12/5/15</a:t>
             </a:fld>
             <a:endParaRPr lang="en-US"/>
           </a:p>
@@ -2051,7 +2051,7 @@
           <a:p>
             <a:fld id="{6425B47B-390B-C241-A7A7-112FF814C3D3}" type="datetimeFigureOut">
               <a:rPr lang="en-US" smtClean="0"/>
-              <a:t>12/2/15</a:t>
+              <a:t>12/5/15</a:t>
             </a:fld>
             <a:endParaRPr lang="en-US"/>
           </a:p>
@@ -2473,7 +2473,7 @@
           <a:p>
             <a:fld id="{6425B47B-390B-C241-A7A7-112FF814C3D3}" type="datetimeFigureOut">
               <a:rPr lang="en-US" smtClean="0"/>
-              <a:t>12/2/15</a:t>
+              <a:t>12/5/15</a:t>
             </a:fld>
             <a:endParaRPr lang="en-US"/>
           </a:p>
@@ -2591,7 +2591,7 @@
           <a:p>
             <a:fld id="{6425B47B-390B-C241-A7A7-112FF814C3D3}" type="datetimeFigureOut">
               <a:rPr lang="en-US" smtClean="0"/>
-              <a:t>12/2/15</a:t>
+              <a:t>12/5/15</a:t>
             </a:fld>
             <a:endParaRPr lang="en-US"/>
           </a:p>
@@ -2686,7 +2686,7 @@
           <a:p>
             <a:fld id="{6425B47B-390B-C241-A7A7-112FF814C3D3}" type="datetimeFigureOut">
               <a:rPr lang="en-US" smtClean="0"/>
-              <a:t>12/2/15</a:t>
+              <a:t>12/5/15</a:t>
             </a:fld>
             <a:endParaRPr lang="en-US"/>
           </a:p>
@@ -2963,7 +2963,7 @@
           <a:p>
             <a:fld id="{6425B47B-390B-C241-A7A7-112FF814C3D3}" type="datetimeFigureOut">
               <a:rPr lang="en-US" smtClean="0"/>
-              <a:t>12/2/15</a:t>
+              <a:t>12/5/15</a:t>
             </a:fld>
             <a:endParaRPr lang="en-US"/>
           </a:p>
@@ -3216,7 +3216,7 @@
           <a:p>
             <a:fld id="{6425B47B-390B-C241-A7A7-112FF814C3D3}" type="datetimeFigureOut">
               <a:rPr lang="en-US" smtClean="0"/>
-              <a:t>12/2/15</a:t>
+              <a:t>12/5/15</a:t>
             </a:fld>
             <a:endParaRPr lang="en-US"/>
           </a:p>
@@ -3429,7 +3429,7 @@
           <a:p>
             <a:fld id="{6425B47B-390B-C241-A7A7-112FF814C3D3}" type="datetimeFigureOut">
               <a:rPr lang="en-US" smtClean="0"/>
-              <a:t>12/2/15</a:t>
+              <a:t>12/5/15</a:t>
             </a:fld>
             <a:endParaRPr lang="en-US"/>
           </a:p>
@@ -8294,14 +8294,7 @@
                 <a:latin typeface="Consolas" panose="020B0609020204030204" pitchFamily="49" charset="0"/>
                 <a:cs typeface="Consolas" panose="020B0609020204030204" pitchFamily="49" charset="0"/>
               </a:rPr>
-              <a:t>incoming  |   </a:t>
-            </a:r>
-            <a:r>
-              <a:rPr lang="en-US" sz="1100" dirty="0" smtClean="0">
-                <a:latin typeface="Consolas" panose="020B0609020204030204" pitchFamily="49" charset="0"/>
-                <a:cs typeface="Consolas" panose="020B0609020204030204" pitchFamily="49" charset="0"/>
-              </a:rPr>
-              <a:t>arg 2    |  %esp - 12</a:t>
+              <a:t>incoming  |   arg 2    |  %esp - 12</a:t>
             </a:r>
           </a:p>
           <a:p>
@@ -8340,7 +8333,21 @@
                 <a:latin typeface="Consolas" panose="020B0609020204030204" pitchFamily="49" charset="0"/>
                 <a:cs typeface="Consolas" panose="020B0609020204030204" pitchFamily="49" charset="0"/>
               </a:rPr>
-              <a:t>   +--   +------------+</a:t>
+              <a:t>   +--   </a:t>
+            </a:r>
+            <a:r>
+              <a:rPr lang="en-US" sz="1100" dirty="0" smtClean="0">
+                <a:latin typeface="Consolas" panose="020B0609020204030204" pitchFamily="49" charset="0"/>
+                <a:cs typeface="Consolas" panose="020B0609020204030204" pitchFamily="49" charset="0"/>
+              </a:rPr>
+              <a:t> +</a:t>
+            </a:r>
+            <a:r>
+              <a:rPr lang="en-US" sz="1100" dirty="0" smtClean="0">
+                <a:latin typeface="Consolas" panose="020B0609020204030204" pitchFamily="49" charset="0"/>
+                <a:cs typeface="Consolas" panose="020B0609020204030204" pitchFamily="49" charset="0"/>
+              </a:rPr>
+              <a:t>------------+</a:t>
             </a:r>
           </a:p>
           <a:p>
@@ -8578,7 +8585,35 @@
                 <a:latin typeface="Consolas" panose="020B0609020204030204" pitchFamily="49" charset="0"/>
                 <a:cs typeface="Consolas" panose="020B0609020204030204" pitchFamily="49" charset="0"/>
               </a:rPr>
-              <a:t>       (A)  Caller’s View         </a:t>
+              <a:t>       </a:t>
+            </a:r>
+            <a:r>
+              <a:rPr lang="en-US" sz="1100" dirty="0" smtClean="0">
+                <a:latin typeface="Consolas" panose="020B0609020204030204" pitchFamily="49" charset="0"/>
+                <a:cs typeface="Consolas" panose="020B0609020204030204" pitchFamily="49" charset="0"/>
+              </a:rPr>
+              <a:t>(B)  </a:t>
+            </a:r>
+            <a:r>
+              <a:rPr lang="en-US" sz="1100" dirty="0" err="1" smtClean="0">
+                <a:latin typeface="Consolas" panose="020B0609020204030204" pitchFamily="49" charset="0"/>
+                <a:cs typeface="Consolas" panose="020B0609020204030204" pitchFamily="49" charset="0"/>
+              </a:rPr>
+              <a:t>Callee’s</a:t>
+            </a:r>
+            <a:r>
+              <a:rPr lang="en-US" sz="1100" dirty="0" smtClean="0">
+                <a:latin typeface="Consolas" panose="020B0609020204030204" pitchFamily="49" charset="0"/>
+                <a:cs typeface="Consolas" panose="020B0609020204030204" pitchFamily="49" charset="0"/>
+              </a:rPr>
+              <a:t> </a:t>
+            </a:r>
+            <a:r>
+              <a:rPr lang="en-US" sz="1100" dirty="0" smtClean="0">
+                <a:latin typeface="Consolas" panose="020B0609020204030204" pitchFamily="49" charset="0"/>
+                <a:cs typeface="Consolas" panose="020B0609020204030204" pitchFamily="49" charset="0"/>
+              </a:rPr>
+              <a:t>View         </a:t>
             </a:r>
             <a:endParaRPr lang="en-US" sz="1100" dirty="0">
               <a:latin typeface="Consolas" panose="020B0609020204030204" pitchFamily="49" charset="0"/>

</xml_diff>